<commit_message>
Adding poster for PASC conference
</commit_message>
<xml_diff>
--- a/poster/PASC 2018 CARMA.pptx
+++ b/poster/PASC 2018 CARMA.pptx
@@ -20505,10 +20505,10 @@
       </p:grpSpPr>
       <p:pic>
         <p:nvPicPr>
-          <p:cNvPr id="30" name="Picture 29">
+          <p:cNvPr id="38" name="Picture 37">
             <a:extLst>
               <a:ext uri="{FF2B5EF4-FFF2-40B4-BE49-F238E27FC236}">
-                <a16:creationId xmlns:a16="http://schemas.microsoft.com/office/drawing/2014/main" id="{FCF0CF2F-051A-8C4E-BDFB-9439A7F2863E}"/>
+                <a16:creationId xmlns:a16="http://schemas.microsoft.com/office/drawing/2014/main" id="{4FB5EEBC-ED24-2447-88EB-E42E160D70F3}"/>
               </a:ext>
             </a:extLst>
           </p:cNvPr>
@@ -20525,8 +20525,8 @@
         </p:blipFill>
         <p:spPr>
           <a:xfrm>
-            <a:off x="5372181" y="6183091"/>
-            <a:ext cx="3134051" cy="2536300"/>
+            <a:off x="5389215" y="6164181"/>
+            <a:ext cx="3101228" cy="2500628"/>
           </a:xfrm>
           <a:prstGeom prst="rect">
             <a:avLst/>
@@ -35580,8 +35580,8 @@
           </a:p>
         </p:txBody>
       </p:sp>
-      <mc:AlternateContent xmlns:mc="http://schemas.openxmlformats.org/markup-compatibility/2006">
-        <mc:Choice xmlns:a14="http://schemas.microsoft.com/office/drawing/2010/main" Requires="a14">
+      <mc:AlternateContent xmlns:mc="http://schemas.openxmlformats.org/markup-compatibility/2006" xmlns:a14="http://schemas.microsoft.com/office/drawing/2010/main">
+        <mc:Choice Requires="a14">
           <p:sp>
             <p:nvSpPr>
               <p:cNvPr id="3" name="TextBox 2">
@@ -35631,7 +35631,7 @@
             </p:txBody>
           </p:sp>
         </mc:Choice>
-        <mc:Fallback>
+        <mc:Fallback xmlns="">
           <p:sp>
             <p:nvSpPr>
               <p:cNvPr id="3" name="TextBox 2">
@@ -35676,8 +35676,8 @@
           </p:sp>
         </mc:Fallback>
       </mc:AlternateContent>
-      <mc:AlternateContent xmlns:mc="http://schemas.openxmlformats.org/markup-compatibility/2006">
-        <mc:Choice xmlns:a14="http://schemas.microsoft.com/office/drawing/2010/main" Requires="a14">
+      <mc:AlternateContent xmlns:mc="http://schemas.openxmlformats.org/markup-compatibility/2006" xmlns:a14="http://schemas.microsoft.com/office/drawing/2010/main">
+        <mc:Choice Requires="a14">
           <p:sp>
             <p:nvSpPr>
               <p:cNvPr id="267" name="TextBox 266">
@@ -35727,7 +35727,7 @@
             </p:txBody>
           </p:sp>
         </mc:Choice>
-        <mc:Fallback>
+        <mc:Fallback xmlns="">
           <p:sp>
             <p:nvSpPr>
               <p:cNvPr id="267" name="TextBox 266">
@@ -35772,8 +35772,8 @@
           </p:sp>
         </mc:Fallback>
       </mc:AlternateContent>
-      <mc:AlternateContent xmlns:mc="http://schemas.openxmlformats.org/markup-compatibility/2006">
-        <mc:Choice xmlns:a14="http://schemas.microsoft.com/office/drawing/2010/main" Requires="a14">
+      <mc:AlternateContent xmlns:mc="http://schemas.openxmlformats.org/markup-compatibility/2006" xmlns:a14="http://schemas.microsoft.com/office/drawing/2010/main">
+        <mc:Choice Requires="a14">
           <p:sp>
             <p:nvSpPr>
               <p:cNvPr id="268" name="TextBox 267">
@@ -35823,7 +35823,7 @@
             </p:txBody>
           </p:sp>
         </mc:Choice>
-        <mc:Fallback>
+        <mc:Fallback xmlns="">
           <p:sp>
             <p:nvSpPr>
               <p:cNvPr id="268" name="TextBox 267">
@@ -35868,8 +35868,8 @@
           </p:sp>
         </mc:Fallback>
       </mc:AlternateContent>
-      <mc:AlternateContent xmlns:mc="http://schemas.openxmlformats.org/markup-compatibility/2006">
-        <mc:Choice xmlns:a14="http://schemas.microsoft.com/office/drawing/2010/main" Requires="a14">
+      <mc:AlternateContent xmlns:mc="http://schemas.openxmlformats.org/markup-compatibility/2006" xmlns:a14="http://schemas.microsoft.com/office/drawing/2010/main">
+        <mc:Choice Requires="a14">
           <p:sp>
             <p:nvSpPr>
               <p:cNvPr id="269" name="TextBox 268">
@@ -35920,7 +35920,7 @@
             </p:txBody>
           </p:sp>
         </mc:Choice>
-        <mc:Fallback>
+        <mc:Fallback xmlns="">
           <p:sp>
             <p:nvSpPr>
               <p:cNvPr id="269" name="TextBox 268">
@@ -35965,8 +35965,8 @@
           </p:sp>
         </mc:Fallback>
       </mc:AlternateContent>
-      <mc:AlternateContent xmlns:mc="http://schemas.openxmlformats.org/markup-compatibility/2006">
-        <mc:Choice xmlns:a14="http://schemas.microsoft.com/office/drawing/2010/main" Requires="a14">
+      <mc:AlternateContent xmlns:mc="http://schemas.openxmlformats.org/markup-compatibility/2006" xmlns:a14="http://schemas.microsoft.com/office/drawing/2010/main">
+        <mc:Choice Requires="a14">
           <p:sp>
             <p:nvSpPr>
               <p:cNvPr id="270" name="TextBox 269">
@@ -36016,7 +36016,7 @@
             </p:txBody>
           </p:sp>
         </mc:Choice>
-        <mc:Fallback>
+        <mc:Fallback xmlns="">
           <p:sp>
             <p:nvSpPr>
               <p:cNvPr id="270" name="TextBox 269">
@@ -36102,8 +36102,8 @@
           </a:p>
         </p:txBody>
       </p:sp>
-      <mc:AlternateContent xmlns:mc="http://schemas.openxmlformats.org/markup-compatibility/2006">
-        <mc:Choice xmlns:a14="http://schemas.microsoft.com/office/drawing/2010/main" Requires="a14">
+      <mc:AlternateContent xmlns:mc="http://schemas.openxmlformats.org/markup-compatibility/2006" xmlns:a14="http://schemas.microsoft.com/office/drawing/2010/main">
+        <mc:Choice Requires="a14">
           <p:sp>
             <p:nvSpPr>
               <p:cNvPr id="274" name="TextBox 273">
@@ -36160,7 +36160,7 @@
             </p:txBody>
           </p:sp>
         </mc:Choice>
-        <mc:Fallback>
+        <mc:Fallback xmlns="">
           <p:sp>
             <p:nvSpPr>
               <p:cNvPr id="274" name="TextBox 273">
@@ -38971,6 +38971,103 @@
           </p:sp>
         </mc:Fallback>
       </mc:AlternateContent>
+      <mc:AlternateContent xmlns:mc="http://schemas.openxmlformats.org/markup-compatibility/2006" xmlns:a14="http://schemas.microsoft.com/office/drawing/2010/main">
+        <mc:Choice Requires="a14">
+          <p:sp>
+            <p:nvSpPr>
+              <p:cNvPr id="39" name="TextBox 38">
+                <a:extLst>
+                  <a:ext uri="{FF2B5EF4-FFF2-40B4-BE49-F238E27FC236}">
+                    <a16:creationId xmlns:a16="http://schemas.microsoft.com/office/drawing/2014/main" id="{E249B050-14F1-4947-9D78-5C76995DCB6A}"/>
+                  </a:ext>
+                </a:extLst>
+              </p:cNvPr>
+              <p:cNvSpPr txBox="1"/>
+              <p:nvPr/>
+            </p:nvSpPr>
+            <p:spPr>
+              <a:xfrm>
+                <a:off x="6295822" y="8644396"/>
+                <a:ext cx="2192030" cy="276999"/>
+              </a:xfrm>
+              <a:prstGeom prst="rect">
+                <a:avLst/>
+              </a:prstGeom>
+              <a:noFill/>
+            </p:spPr>
+            <p:txBody>
+              <a:bodyPr wrap="square" rtlCol="0">
+                <a:spAutoFit/>
+              </a:bodyPr>
+              <a:lstStyle/>
+              <a:p>
+                <a:r>
+                  <a:rPr lang="en-US" sz="600" dirty="0"/>
+                  <a:t>(tuned) </a:t>
+                </a:r>
+                <a14:m>
+                  <m:oMath xmlns:m="http://schemas.openxmlformats.org/officeDocument/2006/math">
+                    <m:r>
+                      <a:rPr lang="en-US" sz="600" b="0" i="1" smtClean="0">
+                        <a:latin typeface="Cambria Math" panose="02040503050406030204" pitchFamily="18" charset="0"/>
+                      </a:rPr>
+                      <m:t>∗</m:t>
+                    </m:r>
+                  </m:oMath>
+                </a14:m>
+                <a:r>
+                  <a:rPr lang="en-US" sz="600" dirty="0"/>
+                  <a:t> in the plot means the configuration (e.g. #ranks/node, #cores/rank,…)  which maximizes the TPS was chosen.</a:t>
+                </a:r>
+              </a:p>
+            </p:txBody>
+          </p:sp>
+        </mc:Choice>
+        <mc:Fallback xmlns="">
+          <p:sp>
+            <p:nvSpPr>
+              <p:cNvPr id="39" name="TextBox 38">
+                <a:extLst>
+                  <a:ext uri="{FF2B5EF4-FFF2-40B4-BE49-F238E27FC236}">
+                    <a16:creationId xmlns:a16="http://schemas.microsoft.com/office/drawing/2014/main" id="{E249B050-14F1-4947-9D78-5C76995DCB6A}"/>
+                  </a:ext>
+                </a:extLst>
+              </p:cNvPr>
+              <p:cNvSpPr txBox="1">
+                <a:spLocks noRot="1" noChangeAspect="1" noMove="1" noResize="1" noEditPoints="1" noAdjustHandles="1" noChangeArrowheads="1" noChangeShapeType="1" noTextEdit="1"/>
+              </p:cNvSpPr>
+              <p:nvPr/>
+            </p:nvSpPr>
+            <p:spPr>
+              <a:xfrm>
+                <a:off x="6295822" y="8644396"/>
+                <a:ext cx="2192030" cy="276999"/>
+              </a:xfrm>
+              <a:prstGeom prst="rect">
+                <a:avLst/>
+              </a:prstGeom>
+              <a:blipFill>
+                <a:blip r:embed="rId34"/>
+                <a:stretch>
+                  <a:fillRect b="-4545"/>
+                </a:stretch>
+              </a:blipFill>
+            </p:spPr>
+            <p:txBody>
+              <a:bodyPr/>
+              <a:lstStyle/>
+              <a:p>
+                <a:r>
+                  <a:rPr lang="en-US">
+                    <a:noFill/>
+                  </a:rPr>
+                  <a:t> </a:t>
+                </a:r>
+              </a:p>
+            </p:txBody>
+          </p:sp>
+        </mc:Fallback>
+      </mc:AlternateContent>
     </p:spTree>
     <p:extLst>
       <p:ext uri="{BB962C8B-B14F-4D97-AF65-F5344CB8AC3E}">

</xml_diff>

<commit_message>
Refactored the communication backends
</commit_message>
<xml_diff>
--- a/poster/PASC 2018 CARMA.pptx
+++ b/poster/PASC 2018 CARMA.pptx
@@ -198,7 +198,7 @@
           <a:p>
             <a:fld id="{00894EBF-46A4-744B-B368-C674398B1A6E}" type="datetimeFigureOut">
               <a:rPr lang="en-US" smtClean="0"/>
-              <a:t>6/4/18</a:t>
+              <a:t>6/27/18</a:t>
             </a:fld>
             <a:endParaRPr lang="en-US"/>
           </a:p>
@@ -38971,8 +38971,8 @@
           </p:sp>
         </mc:Fallback>
       </mc:AlternateContent>
-      <mc:AlternateContent xmlns:mc="http://schemas.openxmlformats.org/markup-compatibility/2006" xmlns:a14="http://schemas.microsoft.com/office/drawing/2010/main">
-        <mc:Choice Requires="a14">
+      <mc:AlternateContent xmlns:mc="http://schemas.openxmlformats.org/markup-compatibility/2006">
+        <mc:Choice xmlns:a14="http://schemas.microsoft.com/office/drawing/2010/main" Requires="a14">
           <p:sp>
             <p:nvSpPr>
               <p:cNvPr id="39" name="TextBox 38">
@@ -39017,13 +39017,13 @@
                 </a14:m>
                 <a:r>
                   <a:rPr lang="en-US" sz="600" dirty="0"/>
-                  <a:t> in the plot means the configuration (e.g. #ranks/node, #cores/rank,…)  which maximizes the TPS was chosen.</a:t>
+                  <a:t> in the plot means the configuration (e.g. #ranks/node, #cores/rank, etc.)  which maximizes the TPS was chosen.</a:t>
                 </a:r>
               </a:p>
             </p:txBody>
           </p:sp>
         </mc:Choice>
-        <mc:Fallback xmlns="">
+        <mc:Fallback>
           <p:sp>
             <p:nvSpPr>
               <p:cNvPr id="39" name="TextBox 38">

</xml_diff>